<commit_message>
Add slide highlighting Team Scalability
Done. I've added a new "Team Scalability" slide (now slide 13) with these points:

Work can be parallelized across team members
Endpoint development decoupled from Ansible module work
Clear module boundaries reduce merge conflicts
New contributors can focus on one domain without full codebase knowledge
Enables efficient resource allocation across projects
The presentation now has 17 slides total, with the new slide fitting naturally between "Developer Experience" and "Maintainability at Scale."
</commit_message>
<xml_diff>
--- a/endpoint_library_presentation.pptx
+++ b/endpoint_library_presentation.pptx
@@ -21,6 +21,7 @@
     <p:sldId id="269" r:id="rId20"/>
     <p:sldId id="270" r:id="rId21"/>
     <p:sldId id="271" r:id="rId22"/>
+    <p:sldId id="272" r:id="rId23"/>
   </p:sldIdLst>
   <p:sldSz cx="9144000" cy="6858000" type="screen4x3"/>
   <p:notesSz cx="6858000" cy="9144000"/>
@@ -3958,7 +3959,7 @@
               </a:defRPr>
             </a:pPr>
             <a:r>
-              <a:t>Maintainability at Scale</a:t>
+              <a:t>Team Scalability</a:t>
             </a:r>
           </a:p>
         </p:txBody>
@@ -4039,7 +4040,7 @@
               </a:defRPr>
             </a:pPr>
             <a:r>
-              <a:t>• API contract encoded in the type system</a:t>
+              <a:t>• Work can be parallelized across team members</a:t>
             </a:r>
           </a:p>
           <a:p>
@@ -4054,7 +4055,7 @@
               </a:defRPr>
             </a:pPr>
             <a:r>
-              <a:t>• Change a constraint once, propagates everywhere</a:t>
+              <a:t>• Endpoint development decoupled from Ansible module work</a:t>
             </a:r>
           </a:p>
           <a:p>
@@ -4069,7 +4070,7 @@
               </a:defRPr>
             </a:pPr>
             <a:r>
-              <a:t>• Clear separation makes debugging easier</a:t>
+              <a:t>• Clear module boundaries reduce merge conflicts</a:t>
             </a:r>
           </a:p>
           <a:p>
@@ -4084,7 +4085,7 @@
               </a:defRPr>
             </a:pPr>
             <a:r>
-              <a:t>• Consistent patterns reduce cognitive load</a:t>
+              <a:t>• New contributors can focus on one domain without full codebase knowledge</a:t>
             </a:r>
           </a:p>
           <a:p>
@@ -4099,7 +4100,7 @@
               </a:defRPr>
             </a:pPr>
             <a:r>
-              <a:t>• Documentation lives with the code</a:t>
+              <a:t>• Enables efficient resource allocation across projects</a:t>
             </a:r>
           </a:p>
         </p:txBody>
@@ -4152,7 +4153,7 @@
               </a:defRPr>
             </a:pPr>
             <a:r>
-              <a:t>Graceful Degradation</a:t>
+              <a:t>Maintainability at Scale</a:t>
             </a:r>
           </a:p>
         </p:txBody>
@@ -4233,7 +4234,7 @@
               </a:defRPr>
             </a:pPr>
             <a:r>
-              <a:t>• Works with or without Pydantic installed</a:t>
+              <a:t>• API contract encoded in the type system</a:t>
             </a:r>
           </a:p>
           <a:p>
@@ -4248,7 +4249,7 @@
               </a:defRPr>
             </a:pPr>
             <a:r>
-              <a:t>• Fallback classes maintain basic functionality</a:t>
+              <a:t>• Change a constraint once, propagates everywhere</a:t>
             </a:r>
           </a:p>
           <a:p>
@@ -4263,7 +4264,7 @@
               </a:defRPr>
             </a:pPr>
             <a:r>
-              <a:t>• Supports diverse deployment environments</a:t>
+              <a:t>• Clear separation makes debugging easier</a:t>
             </a:r>
           </a:p>
           <a:p>
@@ -4278,7 +4279,22 @@
               </a:defRPr>
             </a:pPr>
             <a:r>
-              <a:t>• Full validation when Pydantic available</a:t>
+              <a:t>• Consistent patterns reduce cognitive load</a:t>
+            </a:r>
+          </a:p>
+          <a:p>
+            <a:pPr>
+              <a:spcAft>
+                <a:spcPts val="1200"/>
+              </a:spcAft>
+              <a:defRPr sz="2000">
+                <a:solidFill>
+                  <a:srgbClr val="333333"/>
+                </a:solidFill>
+              </a:defRPr>
+            </a:pPr>
+            <a:r>
+              <a:t>• Documentation lives with the code</a:t>
             </a:r>
           </a:p>
         </p:txBody>
@@ -4331,7 +4347,7 @@
               </a:defRPr>
             </a:pPr>
             <a:r>
-              <a:t>Summary</a:t>
+              <a:t>Graceful Degradation</a:t>
             </a:r>
           </a:p>
         </p:txBody>
@@ -4412,7 +4428,7 @@
               </a:defRPr>
             </a:pPr>
             <a:r>
-              <a:t>• Yes, it's more code upfront</a:t>
+              <a:t>• Works with or without Pydantic installed</a:t>
             </a:r>
           </a:p>
           <a:p>
@@ -4427,7 +4443,7 @@
               </a:defRPr>
             </a:pPr>
             <a:r>
-              <a:t>• But: fewer runtime errors, better IDE support</a:t>
+              <a:t>• Fallback classes maintain basic functionality</a:t>
             </a:r>
           </a:p>
           <a:p>
@@ -4442,7 +4458,7 @@
               </a:defRPr>
             </a:pPr>
             <a:r>
-              <a:t>• Centralized API knowledge = easier maintenance</a:t>
+              <a:t>• Supports diverse deployment environments</a:t>
             </a:r>
           </a:p>
           <a:p>
@@ -4457,22 +4473,7 @@
               </a:defRPr>
             </a:pPr>
             <a:r>
-              <a:t>• Type safety catches bugs before they ship</a:t>
-            </a:r>
-          </a:p>
-          <a:p>
-            <a:pPr>
-              <a:spcAft>
-                <a:spcPts val="1200"/>
-              </a:spcAft>
-              <a:defRPr sz="2000">
-                <a:solidFill>
-                  <a:srgbClr val="333333"/>
-                </a:solidFill>
-              </a:defRPr>
-            </a:pPr>
-            <a:r>
-              <a:t>• Investment pays off as codebase scales</a:t>
+              <a:t>• Full validation when Pydantic available</a:t>
             </a:r>
           </a:p>
         </p:txBody>
@@ -4486,6 +4487,200 @@
 </file>
 
 <file path=ppt/slides/slide16.xml><?xml version="1.0" encoding="utf-8"?>
+<p:sld xmlns:a="http://schemas.openxmlformats.org/drawingml/2006/main" xmlns:p="http://schemas.openxmlformats.org/presentationml/2006/main" xmlns:r="http://schemas.openxmlformats.org/officeDocument/2006/relationships">
+  <p:cSld>
+    <p:spTree>
+      <p:nvGrpSpPr>
+        <p:cNvPr id="1" name=""/>
+        <p:cNvGrpSpPr/>
+        <p:nvPr/>
+      </p:nvGrpSpPr>
+      <p:grpSpPr/>
+      <p:sp>
+        <p:nvSpPr>
+          <p:cNvPr id="2" name="TextBox 1"/>
+          <p:cNvSpPr txBox="1"/>
+          <p:nvPr/>
+        </p:nvSpPr>
+        <p:spPr>
+          <a:xfrm>
+            <a:off x="457200" y="365760"/>
+            <a:ext cx="8229600" cy="731520"/>
+          </a:xfrm>
+          <a:prstGeom prst="rect">
+            <a:avLst/>
+          </a:prstGeom>
+          <a:noFill/>
+        </p:spPr>
+        <p:txBody>
+          <a:bodyPr wrap="none">
+            <a:spAutoFit/>
+          </a:bodyPr>
+          <a:lstStyle/>
+          <a:p>
+            <a:pPr>
+              <a:defRPr sz="3200" b="1">
+                <a:solidFill>
+                  <a:srgbClr val="1A1A2E"/>
+                </a:solidFill>
+              </a:defRPr>
+            </a:pPr>
+            <a:r>
+              <a:t>Summary</a:t>
+            </a:r>
+          </a:p>
+        </p:txBody>
+      </p:sp>
+      <p:sp>
+        <p:nvSpPr>
+          <p:cNvPr id="3" name="Rectangle 2"/>
+          <p:cNvSpPr/>
+          <p:nvPr/>
+        </p:nvSpPr>
+        <p:spPr>
+          <a:xfrm>
+            <a:off x="457200" y="1051560"/>
+            <a:ext cx="8229600" cy="27432"/>
+          </a:xfrm>
+          <a:prstGeom prst="rect">
+            <a:avLst/>
+          </a:prstGeom>
+          <a:solidFill>
+            <a:srgbClr val="007ACC"/>
+          </a:solidFill>
+          <a:ln>
+            <a:noFill/>
+          </a:ln>
+        </p:spPr>
+        <p:style>
+          <a:lnRef idx="1">
+            <a:schemeClr val="accent1"/>
+          </a:lnRef>
+          <a:fillRef idx="3">
+            <a:schemeClr val="accent1"/>
+          </a:fillRef>
+          <a:effectRef idx="2">
+            <a:schemeClr val="accent1"/>
+          </a:effectRef>
+          <a:fontRef idx="minor">
+            <a:schemeClr val="lt1"/>
+          </a:fontRef>
+        </p:style>
+        <p:txBody>
+          <a:bodyPr rtlCol="0" anchor="ctr"/>
+          <a:lstStyle/>
+          <a:p>
+            <a:pPr algn="ctr"/>
+          </a:p>
+        </p:txBody>
+      </p:sp>
+      <p:sp>
+        <p:nvSpPr>
+          <p:cNvPr id="4" name="TextBox 3"/>
+          <p:cNvSpPr txBox="1"/>
+          <p:nvPr/>
+        </p:nvSpPr>
+        <p:spPr>
+          <a:xfrm>
+            <a:off x="457200" y="1280160"/>
+            <a:ext cx="8229600" cy="4114800"/>
+          </a:xfrm>
+          <a:prstGeom prst="rect">
+            <a:avLst/>
+          </a:prstGeom>
+          <a:noFill/>
+        </p:spPr>
+        <p:txBody>
+          <a:bodyPr wrap="square">
+            <a:spAutoFit/>
+          </a:bodyPr>
+          <a:lstStyle/>
+          <a:p>
+            <a:pPr>
+              <a:spcAft>
+                <a:spcPts val="1200"/>
+              </a:spcAft>
+              <a:defRPr sz="2000">
+                <a:solidFill>
+                  <a:srgbClr val="333333"/>
+                </a:solidFill>
+              </a:defRPr>
+            </a:pPr>
+            <a:r>
+              <a:t>• Yes, it's more code upfront</a:t>
+            </a:r>
+          </a:p>
+          <a:p>
+            <a:pPr>
+              <a:spcAft>
+                <a:spcPts val="1200"/>
+              </a:spcAft>
+              <a:defRPr sz="2000">
+                <a:solidFill>
+                  <a:srgbClr val="333333"/>
+                </a:solidFill>
+              </a:defRPr>
+            </a:pPr>
+            <a:r>
+              <a:t>• But: fewer runtime errors, better IDE support</a:t>
+            </a:r>
+          </a:p>
+          <a:p>
+            <a:pPr>
+              <a:spcAft>
+                <a:spcPts val="1200"/>
+              </a:spcAft>
+              <a:defRPr sz="2000">
+                <a:solidFill>
+                  <a:srgbClr val="333333"/>
+                </a:solidFill>
+              </a:defRPr>
+            </a:pPr>
+            <a:r>
+              <a:t>• Centralized API knowledge = easier maintenance</a:t>
+            </a:r>
+          </a:p>
+          <a:p>
+            <a:pPr>
+              <a:spcAft>
+                <a:spcPts val="1200"/>
+              </a:spcAft>
+              <a:defRPr sz="2000">
+                <a:solidFill>
+                  <a:srgbClr val="333333"/>
+                </a:solidFill>
+              </a:defRPr>
+            </a:pPr>
+            <a:r>
+              <a:t>• Type safety catches bugs before they ship</a:t>
+            </a:r>
+          </a:p>
+          <a:p>
+            <a:pPr>
+              <a:spcAft>
+                <a:spcPts val="1200"/>
+              </a:spcAft>
+              <a:defRPr sz="2000">
+                <a:solidFill>
+                  <a:srgbClr val="333333"/>
+                </a:solidFill>
+              </a:defRPr>
+            </a:pPr>
+            <a:r>
+              <a:t>• Investment pays off as codebase scales</a:t>
+            </a:r>
+          </a:p>
+        </p:txBody>
+      </p:sp>
+    </p:spTree>
+  </p:cSld>
+  <p:clrMapOvr>
+    <a:masterClrMapping/>
+  </p:clrMapOvr>
+</p:sld>
+</file>
+
+<file path=ppt/slides/slide17.xml><?xml version="1.0" encoding="utf-8"?>
 <p:sld xmlns:a="http://schemas.openxmlformats.org/drawingml/2006/main" xmlns:p="http://schemas.openxmlformats.org/presentationml/2006/main" xmlns:r="http://schemas.openxmlformats.org/officeDocument/2006/relationships">
   <p:cSld>
     <p:spTree>

</xml_diff>